<commit_message>
Minor changes, adding this to a github repo now
</commit_message>
<xml_diff>
--- a/scratch/HamburgerDesign.pptx
+++ b/scratch/HamburgerDesign.pptx
@@ -8,6 +8,7 @@
     <p:sldId id="256" r:id="rId2"/>
     <p:sldId id="257" r:id="rId3"/>
     <p:sldId id="258" r:id="rId4"/>
+    <p:sldId id="259" r:id="rId5"/>
   </p:sldIdLst>
   <p:sldSz cx="9144000" cy="6858000" type="screen4x3"/>
   <p:notesSz cx="6858000" cy="9144000"/>
@@ -290,7 +291,7 @@
           <a:p>
             <a:fld id="{1A360BEF-A7CC-9D49-8703-F3BB9EBFE4F6}" type="datetimeFigureOut">
               <a:rPr lang="en-US" smtClean="0"/>
-              <a:t>12/17/14</a:t>
+              <a:t>1/13/15</a:t>
             </a:fld>
             <a:endParaRPr lang="en-US"/>
           </a:p>
@@ -460,7 +461,7 @@
           <a:p>
             <a:fld id="{1A360BEF-A7CC-9D49-8703-F3BB9EBFE4F6}" type="datetimeFigureOut">
               <a:rPr lang="en-US" smtClean="0"/>
-              <a:t>12/17/14</a:t>
+              <a:t>1/13/15</a:t>
             </a:fld>
             <a:endParaRPr lang="en-US"/>
           </a:p>
@@ -640,7 +641,7 @@
           <a:p>
             <a:fld id="{1A360BEF-A7CC-9D49-8703-F3BB9EBFE4F6}" type="datetimeFigureOut">
               <a:rPr lang="en-US" smtClean="0"/>
-              <a:t>12/17/14</a:t>
+              <a:t>1/13/15</a:t>
             </a:fld>
             <a:endParaRPr lang="en-US"/>
           </a:p>
@@ -810,7 +811,7 @@
           <a:p>
             <a:fld id="{1A360BEF-A7CC-9D49-8703-F3BB9EBFE4F6}" type="datetimeFigureOut">
               <a:rPr lang="en-US" smtClean="0"/>
-              <a:t>12/17/14</a:t>
+              <a:t>1/13/15</a:t>
             </a:fld>
             <a:endParaRPr lang="en-US"/>
           </a:p>
@@ -1056,7 +1057,7 @@
           <a:p>
             <a:fld id="{1A360BEF-A7CC-9D49-8703-F3BB9EBFE4F6}" type="datetimeFigureOut">
               <a:rPr lang="en-US" smtClean="0"/>
-              <a:t>12/17/14</a:t>
+              <a:t>1/13/15</a:t>
             </a:fld>
             <a:endParaRPr lang="en-US"/>
           </a:p>
@@ -1344,7 +1345,7 @@
           <a:p>
             <a:fld id="{1A360BEF-A7CC-9D49-8703-F3BB9EBFE4F6}" type="datetimeFigureOut">
               <a:rPr lang="en-US" smtClean="0"/>
-              <a:t>12/17/14</a:t>
+              <a:t>1/13/15</a:t>
             </a:fld>
             <a:endParaRPr lang="en-US"/>
           </a:p>
@@ -1766,7 +1767,7 @@
           <a:p>
             <a:fld id="{1A360BEF-A7CC-9D49-8703-F3BB9EBFE4F6}" type="datetimeFigureOut">
               <a:rPr lang="en-US" smtClean="0"/>
-              <a:t>12/17/14</a:t>
+              <a:t>1/13/15</a:t>
             </a:fld>
             <a:endParaRPr lang="en-US"/>
           </a:p>
@@ -1884,7 +1885,7 @@
           <a:p>
             <a:fld id="{1A360BEF-A7CC-9D49-8703-F3BB9EBFE4F6}" type="datetimeFigureOut">
               <a:rPr lang="en-US" smtClean="0"/>
-              <a:t>12/17/14</a:t>
+              <a:t>1/13/15</a:t>
             </a:fld>
             <a:endParaRPr lang="en-US"/>
           </a:p>
@@ -1979,7 +1980,7 @@
           <a:p>
             <a:fld id="{1A360BEF-A7CC-9D49-8703-F3BB9EBFE4F6}" type="datetimeFigureOut">
               <a:rPr lang="en-US" smtClean="0"/>
-              <a:t>12/17/14</a:t>
+              <a:t>1/13/15</a:t>
             </a:fld>
             <a:endParaRPr lang="en-US"/>
           </a:p>
@@ -2256,7 +2257,7 @@
           <a:p>
             <a:fld id="{1A360BEF-A7CC-9D49-8703-F3BB9EBFE4F6}" type="datetimeFigureOut">
               <a:rPr lang="en-US" smtClean="0"/>
-              <a:t>12/17/14</a:t>
+              <a:t>1/13/15</a:t>
             </a:fld>
             <a:endParaRPr lang="en-US"/>
           </a:p>
@@ -2509,7 +2510,7 @@
           <a:p>
             <a:fld id="{1A360BEF-A7CC-9D49-8703-F3BB9EBFE4F6}" type="datetimeFigureOut">
               <a:rPr lang="en-US" smtClean="0"/>
-              <a:t>12/17/14</a:t>
+              <a:t>1/13/15</a:t>
             </a:fld>
             <a:endParaRPr lang="en-US"/>
           </a:p>
@@ -2722,7 +2723,7 @@
           <a:p>
             <a:fld id="{1A360BEF-A7CC-9D49-8703-F3BB9EBFE4F6}" type="datetimeFigureOut">
               <a:rPr lang="en-US" smtClean="0"/>
-              <a:t>12/17/14</a:t>
+              <a:t>1/13/15</a:t>
             </a:fld>
             <a:endParaRPr lang="en-US"/>
           </a:p>
@@ -3536,6 +3537,182 @@
     <p:extLst>
       <p:ext uri="{BB962C8B-B14F-4D97-AF65-F5344CB8AC3E}">
         <p14:creationId xmlns:p14="http://schemas.microsoft.com/office/powerpoint/2010/main" val="1832707446"/>
+      </p:ext>
+    </p:extLst>
+  </p:cSld>
+  <p:clrMapOvr>
+    <a:masterClrMapping/>
+  </p:clrMapOvr>
+</p:sld>
+</file>
+
+<file path=ppt/slides/slide4.xml><?xml version="1.0" encoding="utf-8"?>
+<p:sld xmlns:a="http://schemas.openxmlformats.org/drawingml/2006/main" xmlns:r="http://schemas.openxmlformats.org/officeDocument/2006/relationships" xmlns:p="http://schemas.openxmlformats.org/presentationml/2006/main">
+  <p:cSld>
+    <p:spTree>
+      <p:nvGrpSpPr>
+        <p:cNvPr id="1" name=""/>
+        <p:cNvGrpSpPr/>
+        <p:nvPr/>
+      </p:nvGrpSpPr>
+      <p:grpSpPr>
+        <a:xfrm>
+          <a:off x="0" y="0"/>
+          <a:ext cx="0" cy="0"/>
+          <a:chOff x="0" y="0"/>
+          <a:chExt cx="0" cy="0"/>
+        </a:xfrm>
+      </p:grpSpPr>
+      <p:sp>
+        <p:nvSpPr>
+          <p:cNvPr id="3" name="Rectangle 2"/>
+          <p:cNvSpPr/>
+          <p:nvPr/>
+        </p:nvSpPr>
+        <p:spPr>
+          <a:xfrm>
+            <a:off x="0" y="460573"/>
+            <a:ext cx="8526492" cy="6397427"/>
+          </a:xfrm>
+          <a:prstGeom prst="rect">
+            <a:avLst/>
+          </a:prstGeom>
+        </p:spPr>
+        <p:style>
+          <a:lnRef idx="1">
+            <a:schemeClr val="accent1"/>
+          </a:lnRef>
+          <a:fillRef idx="3">
+            <a:schemeClr val="accent1"/>
+          </a:fillRef>
+          <a:effectRef idx="2">
+            <a:schemeClr val="accent1"/>
+          </a:effectRef>
+          <a:fontRef idx="minor">
+            <a:schemeClr val="lt1"/>
+          </a:fontRef>
+        </p:style>
+        <p:txBody>
+          <a:bodyPr rtlCol="0" anchor="ctr"/>
+          <a:lstStyle/>
+          <a:p>
+            <a:pPr algn="ctr"/>
+            <a:endParaRPr lang="en-US"/>
+          </a:p>
+        </p:txBody>
+      </p:sp>
+      <p:cxnSp>
+        <p:nvCxnSpPr>
+          <p:cNvPr id="5" name="Straight Connector 4"/>
+          <p:cNvCxnSpPr/>
+          <p:nvPr/>
+        </p:nvCxnSpPr>
+        <p:spPr>
+          <a:xfrm>
+            <a:off x="2236833" y="1800683"/>
+            <a:ext cx="1345891" cy="0"/>
+          </a:xfrm>
+          <a:prstGeom prst="line">
+            <a:avLst/>
+          </a:prstGeom>
+          <a:ln w="127000" cap="rnd">
+            <a:solidFill>
+              <a:srgbClr val="FFFFFF"/>
+            </a:solidFill>
+          </a:ln>
+          <a:effectLst/>
+        </p:spPr>
+        <p:style>
+          <a:lnRef idx="2">
+            <a:schemeClr val="accent1"/>
+          </a:lnRef>
+          <a:fillRef idx="0">
+            <a:schemeClr val="accent1"/>
+          </a:fillRef>
+          <a:effectRef idx="1">
+            <a:schemeClr val="accent1"/>
+          </a:effectRef>
+          <a:fontRef idx="minor">
+            <a:schemeClr val="tx1"/>
+          </a:fontRef>
+        </p:style>
+      </p:cxnSp>
+      <p:cxnSp>
+        <p:nvCxnSpPr>
+          <p:cNvPr id="9" name="Straight Connector 8"/>
+          <p:cNvCxnSpPr/>
+          <p:nvPr/>
+        </p:nvCxnSpPr>
+        <p:spPr>
+          <a:xfrm>
+            <a:off x="2236833" y="2256357"/>
+            <a:ext cx="1345891" cy="0"/>
+          </a:xfrm>
+          <a:prstGeom prst="line">
+            <a:avLst/>
+          </a:prstGeom>
+          <a:ln w="127000" cap="rnd">
+            <a:solidFill>
+              <a:srgbClr val="FFFFFF"/>
+            </a:solidFill>
+          </a:ln>
+          <a:effectLst/>
+        </p:spPr>
+        <p:style>
+          <a:lnRef idx="2">
+            <a:schemeClr val="accent1"/>
+          </a:lnRef>
+          <a:fillRef idx="0">
+            <a:schemeClr val="accent1"/>
+          </a:fillRef>
+          <a:effectRef idx="1">
+            <a:schemeClr val="accent1"/>
+          </a:effectRef>
+          <a:fontRef idx="minor">
+            <a:schemeClr val="tx1"/>
+          </a:fontRef>
+        </p:style>
+      </p:cxnSp>
+      <p:cxnSp>
+        <p:nvCxnSpPr>
+          <p:cNvPr id="10" name="Straight Connector 9"/>
+          <p:cNvCxnSpPr/>
+          <p:nvPr/>
+        </p:nvCxnSpPr>
+        <p:spPr>
+          <a:xfrm>
+            <a:off x="2236833" y="2712032"/>
+            <a:ext cx="1353312" cy="0"/>
+          </a:xfrm>
+          <a:prstGeom prst="line">
+            <a:avLst/>
+          </a:prstGeom>
+          <a:ln w="127000" cap="rnd" cmpd="sng">
+            <a:solidFill>
+              <a:schemeClr val="bg1"/>
+            </a:solidFill>
+          </a:ln>
+          <a:effectLst/>
+        </p:spPr>
+        <p:style>
+          <a:lnRef idx="2">
+            <a:schemeClr val="accent1"/>
+          </a:lnRef>
+          <a:fillRef idx="0">
+            <a:schemeClr val="accent1"/>
+          </a:fillRef>
+          <a:effectRef idx="1">
+            <a:schemeClr val="accent1"/>
+          </a:effectRef>
+          <a:fontRef idx="minor">
+            <a:schemeClr val="tx1"/>
+          </a:fontRef>
+        </p:style>
+      </p:cxnSp>
+    </p:spTree>
+    <p:extLst>
+      <p:ext uri="{BB962C8B-B14F-4D97-AF65-F5344CB8AC3E}">
+        <p14:creationId xmlns:p14="http://schemas.microsoft.com/office/powerpoint/2010/main" val="2280611853"/>
       </p:ext>
     </p:extLst>
   </p:cSld>

</xml_diff>